<commit_message>
documentacion y algunos notice los oculte
</commit_message>
<xml_diff>
--- a/Documentacion/Presentacion_Final.pptx
+++ b/Documentacion/Presentacion_Final.pptx
@@ -6741,35 +6741,8 @@
                 <a:latin typeface="Arial" panose="020B0604020202020204" pitchFamily="34" charset="0"/>
                 <a:cs typeface="Arial" panose="020B0604020202020204" pitchFamily="34" charset="0"/>
               </a:rPr>
-              <a:t>DESARROLLO  24/04/2018 </a:t>
-            </a:r>
-            <a:r>
-              <a:rPr lang="pt-BR" sz="2400" cap="all" dirty="0" smtClean="0">
-                <a:solidFill>
-                  <a:srgbClr val="FF0000"/>
-                </a:solidFill>
-                <a:latin typeface="Arial" panose="020B0604020202020204" pitchFamily="34" charset="0"/>
-                <a:cs typeface="Arial" panose="020B0604020202020204" pitchFamily="34" charset="0"/>
-              </a:rPr>
-              <a:t>– </a:t>
-            </a:r>
-            <a:r>
-              <a:rPr lang="pt-BR" sz="2400" cap="all" dirty="0" smtClean="0">
-                <a:solidFill>
-                  <a:srgbClr val="FF0000"/>
-                </a:solidFill>
-                <a:latin typeface="Arial" panose="020B0604020202020204" pitchFamily="34" charset="0"/>
-                <a:cs typeface="Arial" panose="020B0604020202020204" pitchFamily="34" charset="0"/>
-              </a:rPr>
-              <a:t>10/05/2018</a:t>
-            </a:r>
-            <a:endParaRPr lang="pt-BR" sz="2400" cap="all" dirty="0" smtClean="0">
-              <a:solidFill>
-                <a:srgbClr val="FF0000"/>
-              </a:solidFill>
-              <a:latin typeface="Arial" panose="020B0604020202020204" pitchFamily="34" charset="0"/>
-              <a:cs typeface="Arial" panose="020B0604020202020204" pitchFamily="34" charset="0"/>
-            </a:endParaRPr>
+              <a:t>DESARROLLO  24/04/2018 – 10/05/2018</a:t>
+            </a:r>
           </a:p>
           <a:p>
             <a:pPr algn="ctr" fontAlgn="base"/>
@@ -6791,17 +6764,7 @@
                 <a:latin typeface="Arial" panose="020B0604020202020204" pitchFamily="34" charset="0"/>
                 <a:cs typeface="Arial" panose="020B0604020202020204" pitchFamily="34" charset="0"/>
               </a:rPr>
-              <a:t> a </a:t>
-            </a:r>
-            <a:r>
-              <a:rPr lang="pt-BR" sz="2400" cap="all" dirty="0" smtClean="0">
-                <a:solidFill>
-                  <a:srgbClr val="FF0000"/>
-                </a:solidFill>
-                <a:latin typeface="Arial" panose="020B0604020202020204" pitchFamily="34" charset="0"/>
-                <a:cs typeface="Arial" panose="020B0604020202020204" pitchFamily="34" charset="0"/>
-              </a:rPr>
-              <a:t>realizar</a:t>
+              <a:t> a realizar</a:t>
             </a:r>
             <a:endParaRPr lang="pt-BR" sz="2400" cap="all" dirty="0">
               <a:solidFill>
@@ -6909,12 +6872,12 @@
                         <a:buChar char="•"/>
                       </a:pPr>
                       <a:r>
-                        <a:rPr lang="es-SV" sz="1600" u="none" strike="noStrike">
+                        <a:rPr lang="es-SV" sz="1600" u="none" strike="noStrike" dirty="0">
                           <a:effectLst/>
                         </a:rPr>
                         <a:t>Diseño de reporte para imprimir horario</a:t>
                       </a:r>
-                      <a:endParaRPr lang="es-SV" sz="1600" b="0" i="0" u="none" strike="noStrike">
+                      <a:endParaRPr lang="es-SV" sz="1600" b="0" i="0" u="none" strike="noStrike" dirty="0">
                         <a:solidFill>
                           <a:srgbClr val="000000"/>
                         </a:solidFill>
@@ -7558,45 +7521,8 @@
                 <a:latin typeface="Arial" panose="020B0604020202020204" pitchFamily="34" charset="0"/>
                 <a:cs typeface="Arial" panose="020B0604020202020204" pitchFamily="34" charset="0"/>
               </a:rPr>
-              <a:t>FINAL  11/05/2018 </a:t>
-            </a:r>
-            <a:r>
-              <a:rPr lang="pt-BR" sz="2400" cap="all" dirty="0" smtClean="0">
-                <a:solidFill>
-                  <a:srgbClr val="FF0000"/>
-                </a:solidFill>
-                <a:latin typeface="Arial" panose="020B0604020202020204" pitchFamily="34" charset="0"/>
-                <a:cs typeface="Arial" panose="020B0604020202020204" pitchFamily="34" charset="0"/>
-              </a:rPr>
-              <a:t>– </a:t>
-            </a:r>
-            <a:r>
-              <a:rPr lang="pt-BR" sz="2400" cap="all" dirty="0" smtClean="0">
-                <a:solidFill>
-                  <a:srgbClr val="FF0000"/>
-                </a:solidFill>
-                <a:latin typeface="Arial" panose="020B0604020202020204" pitchFamily="34" charset="0"/>
-                <a:cs typeface="Arial" panose="020B0604020202020204" pitchFamily="34" charset="0"/>
-              </a:rPr>
-              <a:t>29</a:t>
-            </a:r>
-            <a:r>
-              <a:rPr lang="pt-BR" sz="2400" cap="all" dirty="0" smtClean="0">
-                <a:solidFill>
-                  <a:srgbClr val="FF0000"/>
-                </a:solidFill>
-                <a:latin typeface="Arial" panose="020B0604020202020204" pitchFamily="34" charset="0"/>
-                <a:cs typeface="Arial" panose="020B0604020202020204" pitchFamily="34" charset="0"/>
-              </a:rPr>
-              <a:t>/05/2018</a:t>
-            </a:r>
-            <a:endParaRPr lang="pt-BR" sz="2400" cap="all" dirty="0" smtClean="0">
-              <a:solidFill>
-                <a:srgbClr val="FF0000"/>
-              </a:solidFill>
-              <a:latin typeface="Arial" panose="020B0604020202020204" pitchFamily="34" charset="0"/>
-              <a:cs typeface="Arial" panose="020B0604020202020204" pitchFamily="34" charset="0"/>
-            </a:endParaRPr>
+              <a:t>FINAL  11/05/2018 – 29/05/2018</a:t>
+            </a:r>
           </a:p>
           <a:p>
             <a:pPr algn="ctr" fontAlgn="base"/>
@@ -7618,17 +7544,7 @@
                 <a:latin typeface="Arial" panose="020B0604020202020204" pitchFamily="34" charset="0"/>
                 <a:cs typeface="Arial" panose="020B0604020202020204" pitchFamily="34" charset="0"/>
               </a:rPr>
-              <a:t> a </a:t>
-            </a:r>
-            <a:r>
-              <a:rPr lang="pt-BR" sz="2400" cap="all" dirty="0" smtClean="0">
-                <a:solidFill>
-                  <a:srgbClr val="FF0000"/>
-                </a:solidFill>
-                <a:latin typeface="Arial" panose="020B0604020202020204" pitchFamily="34" charset="0"/>
-                <a:cs typeface="Arial" panose="020B0604020202020204" pitchFamily="34" charset="0"/>
-              </a:rPr>
-              <a:t>realizar</a:t>
+              <a:t> a realizar</a:t>
             </a:r>
             <a:endParaRPr lang="pt-BR" sz="2400" cap="all" dirty="0">
               <a:solidFill>
@@ -7649,7 +7565,7 @@
         <p:spPr>
           <a:xfrm>
             <a:off x="1700011" y="1891219"/>
-            <a:ext cx="7343102" cy="3693319"/>
+            <a:ext cx="7343102" cy="3416320"/>
           </a:xfrm>
           <a:prstGeom prst="rect">
             <a:avLst/>
@@ -7910,34 +7826,14 @@
                 <a:latin typeface="Arial" panose="020B0604020202020204" pitchFamily="34" charset="0"/>
                 <a:cs typeface="Arial" panose="020B0604020202020204" pitchFamily="34" charset="0"/>
               </a:rPr>
-              <a:t>creación de script de migración de registros entre bases de datos</a:t>
-            </a:r>
-            <a:endParaRPr lang="es-ES" sz="1200" dirty="0">
-              <a:latin typeface="Arial" panose="020B0604020202020204" pitchFamily="34" charset="0"/>
-              <a:cs typeface="Arial" panose="020B0604020202020204" pitchFamily="34" charset="0"/>
-            </a:endParaRPr>
-          </a:p>
-          <a:p>
-            <a:pPr marL="171450" indent="-171450" fontAlgn="ctr">
-              <a:lnSpc>
-                <a:spcPct val="150000"/>
-              </a:lnSpc>
-              <a:buFont typeface="Arial" panose="020B0604020202020204" pitchFamily="34" charset="0"/>
-              <a:buChar char="•"/>
-            </a:pPr>
-            <a:r>
-              <a:rPr lang="es-SV" sz="1200" dirty="0">
-                <a:latin typeface="Arial" panose="020B0604020202020204" pitchFamily="34" charset="0"/>
-                <a:cs typeface="Arial" panose="020B0604020202020204" pitchFamily="34" charset="0"/>
-              </a:rPr>
-              <a:t>Programación de calendario de </a:t>
+              <a:t>creación de script de migración de registros entre bases de </a:t>
             </a:r>
             <a:r>
               <a:rPr lang="es-SV" sz="1200" dirty="0" smtClean="0">
                 <a:latin typeface="Arial" panose="020B0604020202020204" pitchFamily="34" charset="0"/>
                 <a:cs typeface="Arial" panose="020B0604020202020204" pitchFamily="34" charset="0"/>
               </a:rPr>
-              <a:t>actividades</a:t>
+              <a:t>datos</a:t>
             </a:r>
             <a:endParaRPr lang="es-ES" sz="1200" dirty="0">
               <a:latin typeface="Arial" panose="020B0604020202020204" pitchFamily="34" charset="0"/>
@@ -11114,7 +11010,7 @@
             <p:ph idx="1"/>
             <p:extLst>
               <p:ext uri="{D42A27DB-BD31-4B8C-83A1-F6EECF244321}">
-                <p14:modId xmlns:p14="http://schemas.microsoft.com/office/powerpoint/2010/main" val="1118410787"/>
+                <p14:modId xmlns:p14="http://schemas.microsoft.com/office/powerpoint/2010/main" val="3400929359"/>
               </p:ext>
             </p:extLst>
           </p:nvPr>
@@ -11149,12 +11045,12 @@
                         </a:spcAft>
                       </a:pPr>
                       <a:r>
-                        <a:rPr lang="es-SV" sz="1400">
+                        <a:rPr lang="es-SV" sz="1400" dirty="0">
                           <a:effectLst/>
                         </a:rPr>
                         <a:t>Cantidad</a:t>
                       </a:r>
-                      <a:endParaRPr lang="es-ES" sz="1100">
+                      <a:endParaRPr lang="es-ES" sz="1100" dirty="0">
                         <a:effectLst/>
                         <a:latin typeface="Calibri" panose="020F0502020204030204" pitchFamily="34" charset="0"/>
                         <a:ea typeface="Calibri" panose="020F0502020204030204" pitchFamily="34" charset="0"/>
@@ -11296,12 +11192,30 @@
                         </a:spcAft>
                       </a:pPr>
                       <a:r>
-                        <a:rPr lang="es-SV" sz="1400">
+                        <a:rPr lang="es-SV" sz="1400" dirty="0">
                           <a:effectLst/>
                         </a:rPr>
-                        <a:t>SO Windows 7 en adelante, procesador de 64 bits, 4 RAM</a:t>
+                        <a:t>SO Windows 7 en adelante, procesador de 64 bits, 4 </a:t>
                       </a:r>
-                      <a:endParaRPr lang="es-ES" sz="1100">
+                      <a:r>
+                        <a:rPr lang="es-SV" sz="1400" dirty="0" smtClean="0">
+                          <a:effectLst/>
+                        </a:rPr>
+                        <a:t>GB</a:t>
+                      </a:r>
+                      <a:r>
+                        <a:rPr lang="es-SV" sz="1400" baseline="0" dirty="0" smtClean="0">
+                          <a:effectLst/>
+                        </a:rPr>
+                        <a:t> </a:t>
+                      </a:r>
+                      <a:r>
+                        <a:rPr lang="es-SV" sz="1400" dirty="0" smtClean="0">
+                          <a:effectLst/>
+                        </a:rPr>
+                        <a:t>RAM</a:t>
+                      </a:r>
+                      <a:endParaRPr lang="es-ES" sz="1100" dirty="0">
                         <a:effectLst/>
                         <a:latin typeface="Calibri" panose="020F0502020204030204" pitchFamily="34" charset="0"/>
                         <a:ea typeface="Calibri" panose="020F0502020204030204" pitchFamily="34" charset="0"/>
@@ -11885,27 +11799,7 @@
                 <a:latin typeface="Arial" panose="020B0604020202020204" pitchFamily="34" charset="0"/>
                 <a:cs typeface="Arial" panose="020B0604020202020204" pitchFamily="34" charset="0"/>
               </a:rPr>
-              <a:t>DESAROLLO </a:t>
-            </a:r>
-            <a:r>
-              <a:rPr lang="es-SV" altLang="es-ES" sz="3200" dirty="0">
-                <a:solidFill>
-                  <a:srgbClr val="FF0000"/>
-                </a:solidFill>
-                <a:latin typeface="Arial" panose="020B0604020202020204" pitchFamily="34" charset="0"/>
-                <a:cs typeface="Arial" panose="020B0604020202020204" pitchFamily="34" charset="0"/>
-              </a:rPr>
-              <a:t>DEL </a:t>
-            </a:r>
-            <a:r>
-              <a:rPr lang="es-SV" altLang="es-ES" sz="3200" dirty="0">
-                <a:solidFill>
-                  <a:srgbClr val="FF0000"/>
-                </a:solidFill>
-                <a:latin typeface="Arial" panose="020B0604020202020204" pitchFamily="34" charset="0"/>
-                <a:cs typeface="Arial" panose="020B0604020202020204" pitchFamily="34" charset="0"/>
-              </a:rPr>
-              <a:t>PROYECTO</a:t>
+              <a:t>DESAROLLO DEL PROYECTO</a:t>
             </a:r>
           </a:p>
         </p:txBody>
@@ -12723,11 +12617,7 @@
                       </a:pPr>
                       <a:r>
                         <a:rPr lang="es-SV" sz="1600" kern="1200" dirty="0" smtClean="0"/>
-                        <a:t>10 </a:t>
-                      </a:r>
-                      <a:r>
-                        <a:rPr lang="es-SV" sz="1600" kern="1200" dirty="0" smtClean="0"/>
-                        <a:t>semanas</a:t>
+                        <a:t>10 semanas</a:t>
                       </a:r>
                       <a:endParaRPr lang="es-SV" sz="1600" kern="1200" dirty="0" smtClean="0">
                         <a:solidFill>
@@ -12973,11 +12863,7 @@
                     <a:p>
                       <a:r>
                         <a:rPr lang="es-SV" sz="1600" dirty="0" smtClean="0"/>
-                        <a:t>Duración </a:t>
-                      </a:r>
-                      <a:r>
-                        <a:rPr lang="es-SV" sz="1600" dirty="0" smtClean="0"/>
-                        <a:t>del</a:t>
+                        <a:t>Duración del</a:t>
                       </a:r>
                       <a:r>
                         <a:rPr lang="es-SV" sz="1600" baseline="0" dirty="0" smtClean="0"/>
@@ -13012,11 +12898,7 @@
                       </a:pPr>
                       <a:r>
                         <a:rPr lang="es-SV" sz="1600" kern="1200" dirty="0" smtClean="0"/>
-                        <a:t>15 </a:t>
-                      </a:r>
-                      <a:r>
-                        <a:rPr lang="es-SV" sz="1600" kern="1200" dirty="0" smtClean="0"/>
-                        <a:t>días</a:t>
+                        <a:t>15 días</a:t>
                       </a:r>
                       <a:endParaRPr lang="es-SV" sz="1600" kern="1200" dirty="0" smtClean="0">
                         <a:solidFill>

</xml_diff>